<commit_message>
Updates to GeoJSON page for a cooler data source
</commit_message>
<xml_diff>
--- a/ppt/REST endpoint tutorial.pptx
+++ b/ppt/REST endpoint tutorial.pptx
@@ -5,10 +5,10 @@
     <p:sldMasterId id="2147483710" r:id="rId4"/>
   </p:sldMasterIdLst>
   <p:notesMasterIdLst>
-    <p:notesMasterId r:id="rId15"/>
+    <p:notesMasterId r:id="rId16"/>
   </p:notesMasterIdLst>
   <p:handoutMasterIdLst>
-    <p:handoutMasterId r:id="rId16"/>
+    <p:handoutMasterId r:id="rId17"/>
   </p:handoutMasterIdLst>
   <p:sldIdLst>
     <p:sldId id="264" r:id="rId5"/>
@@ -17,10 +17,11 @@
     <p:sldId id="271" r:id="rId8"/>
     <p:sldId id="275" r:id="rId9"/>
     <p:sldId id="272" r:id="rId10"/>
-    <p:sldId id="273" r:id="rId11"/>
-    <p:sldId id="274" r:id="rId12"/>
-    <p:sldId id="269" r:id="rId13"/>
-    <p:sldId id="268" r:id="rId14"/>
+    <p:sldId id="276" r:id="rId11"/>
+    <p:sldId id="273" r:id="rId12"/>
+    <p:sldId id="274" r:id="rId13"/>
+    <p:sldId id="269" r:id="rId14"/>
+    <p:sldId id="268" r:id="rId15"/>
   </p:sldIdLst>
   <p:sldSz cx="12192000" cy="6858000"/>
   <p:notesSz cx="7010400" cy="9296400"/>
@@ -216,7 +217,7 @@
               <a:rPr lang="en-US" smtClean="0">
                 <a:latin typeface="NeueHaasGroteskText Std" panose="020B0504020202020204" pitchFamily="34" charset="0"/>
               </a:rPr>
-              <a:t>4/5/2019</a:t>
+              <a:t>4/10/2019</a:t>
             </a:fld>
             <a:endParaRPr lang="en-US" dirty="0">
               <a:latin typeface="NeueHaasGroteskText Std" panose="020B0504020202020204" pitchFamily="34" charset="0"/>
@@ -394,7 +395,7 @@
             <a:fld id="{A50CD39D-89B0-4C68-805A-35C75A7C20C8}" type="datetimeFigureOut">
               <a:rPr lang="en-US" smtClean="0"/>
               <a:pPr/>
-              <a:t>4/5/2019</a:t>
+              <a:t>4/10/2019</a:t>
             </a:fld>
             <a:endParaRPr lang="en-US" dirty="0"/>
           </a:p>
@@ -728,6 +729,63 @@
               <a:tabLst/>
               <a:defRPr/>
             </a:pPr>
+            <a:r>
+              <a:rPr lang="en-US" dirty="0" smtClean="0"/>
+              <a:t>Advertised</a:t>
+            </a:r>
+            <a:r>
+              <a:rPr lang="en-US" baseline="0" dirty="0" smtClean="0"/>
+              <a:t> description: </a:t>
+            </a:r>
+            <a:r>
+              <a:rPr lang="en-US" sz="1200" kern="1200" dirty="0" smtClean="0">
+                <a:solidFill>
+                  <a:schemeClr val="tx1"/>
+                </a:solidFill>
+                <a:effectLst/>
+                <a:latin typeface="NeueHaasGroteskText Std" panose="020B0504020202020204" pitchFamily="34" charset="0"/>
+                <a:ea typeface="+mn-ea"/>
+                <a:cs typeface="+mn-cs"/>
+              </a:rPr>
+              <a:t>Understanding and Using Esri REST Endpoints - </a:t>
+            </a:r>
+            <a:r>
+              <a:rPr lang="en-US" sz="1200" b="1" kern="1200" dirty="0" smtClean="0">
+                <a:solidFill>
+                  <a:schemeClr val="tx1"/>
+                </a:solidFill>
+                <a:effectLst/>
+                <a:latin typeface="NeueHaasGroteskText Std" panose="020B0504020202020204" pitchFamily="34" charset="0"/>
+                <a:ea typeface="+mn-ea"/>
+                <a:cs typeface="+mn-cs"/>
+              </a:rPr>
+              <a:t>Ever wonder what a “REST Endpoint” is? Or how “a Feature Service” works from ArcGIS Online (AGOL) or ArcGIS Server? Or how such services get integrated into web applications? Well, this presentation is for you. Mike Dolbow will demonstrate the concepts covered in </a:t>
+            </a:r>
+            <a:r>
+              <a:rPr lang="en-US" sz="1200" b="1" u="sng" kern="1200" dirty="0" smtClean="0">
+                <a:solidFill>
+                  <a:schemeClr val="tx1"/>
+                </a:solidFill>
+                <a:effectLst/>
+                <a:latin typeface="NeueHaasGroteskText Std" panose="020B0504020202020204" pitchFamily="34" charset="0"/>
+                <a:ea typeface="+mn-ea"/>
+                <a:cs typeface="+mn-cs"/>
+                <a:hlinkClick r:id="rId3"/>
+              </a:rPr>
+              <a:t>this tutorial</a:t>
+            </a:r>
+            <a:r>
+              <a:rPr lang="en-US" sz="1200" b="1" kern="1200" dirty="0" smtClean="0">
+                <a:solidFill>
+                  <a:schemeClr val="tx1"/>
+                </a:solidFill>
+                <a:effectLst/>
+                <a:latin typeface="NeueHaasGroteskText Std" panose="020B0504020202020204" pitchFamily="34" charset="0"/>
+                <a:ea typeface="+mn-ea"/>
+                <a:cs typeface="+mn-cs"/>
+              </a:rPr>
+              <a:t>, including exploring the different parts of an Esri REST endpoint, building queries, and how services can be used in applications like ArcGIS Desktop or inside custom web applications.</a:t>
+            </a:r>
             <a:endParaRPr lang="en-US" dirty="0" smtClean="0"/>
           </a:p>
         </p:txBody>
@@ -1087,7 +1145,7 @@
           <a:p>
             <a:fld id="{A1B96865-10AD-4B23-841D-8E3168399F88}" type="datetime1">
               <a:rPr lang="en-US" smtClean="0"/>
-              <a:t>4/5/2019</a:t>
+              <a:t>4/10/2019</a:t>
             </a:fld>
             <a:endParaRPr lang="en-US" dirty="0"/>
           </a:p>
@@ -1829,7 +1887,7 @@
           <a:p>
             <a:fld id="{81C1D45F-C895-44B4-AC19-5045F38FD658}" type="datetime1">
               <a:rPr lang="en-US" smtClean="0"/>
-              <a:t>4/5/2019</a:t>
+              <a:t>4/10/2019</a:t>
             </a:fld>
             <a:endParaRPr lang="en-US" dirty="0"/>
           </a:p>
@@ -2145,7 +2203,7 @@
           <a:p>
             <a:fld id="{ABD3CDBD-949C-4265-BF1E-0B66C12C50AD}" type="datetime1">
               <a:rPr lang="en-US" smtClean="0"/>
-              <a:t>4/5/2019</a:t>
+              <a:t>4/10/2019</a:t>
             </a:fld>
             <a:endParaRPr lang="en-US" dirty="0"/>
           </a:p>
@@ -2465,7 +2523,7 @@
           <a:p>
             <a:fld id="{9EBE1859-7898-4DD4-953E-DAB91B2880E1}" type="datetime1">
               <a:rPr lang="en-US" smtClean="0"/>
-              <a:t>4/5/2019</a:t>
+              <a:t>4/10/2019</a:t>
             </a:fld>
             <a:endParaRPr lang="en-US" dirty="0"/>
           </a:p>
@@ -2769,7 +2827,7 @@
           <a:p>
             <a:fld id="{725176B2-4DEF-4F82-8528-0CAA412C5F7C}" type="datetime1">
               <a:rPr lang="en-US" smtClean="0"/>
-              <a:t>4/5/2019</a:t>
+              <a:t>4/10/2019</a:t>
             </a:fld>
             <a:endParaRPr lang="en-US" dirty="0"/>
           </a:p>
@@ -3136,7 +3194,7 @@
           <a:p>
             <a:fld id="{BE189EBB-4957-40F1-B15F-EE1B5A7DCD16}" type="datetime1">
               <a:rPr lang="en-US" smtClean="0"/>
-              <a:t>4/5/2019</a:t>
+              <a:t>4/10/2019</a:t>
             </a:fld>
             <a:endParaRPr lang="en-US" dirty="0"/>
           </a:p>
@@ -3495,7 +3553,7 @@
           <a:p>
             <a:fld id="{0A8401B0-0B4D-4516-9C2A-56A5D55090A9}" type="datetime1">
               <a:rPr lang="en-US" smtClean="0"/>
-              <a:t>4/5/2019</a:t>
+              <a:t>4/10/2019</a:t>
             </a:fld>
             <a:endParaRPr lang="en-US" dirty="0"/>
           </a:p>
@@ -3853,7 +3911,7 @@
           <a:p>
             <a:fld id="{7B5D3F78-E386-4F37-BEDB-310CBC4DC24D}" type="datetime1">
               <a:rPr lang="en-US" smtClean="0"/>
-              <a:t>4/5/2019</a:t>
+              <a:t>4/10/2019</a:t>
             </a:fld>
             <a:endParaRPr lang="en-US" dirty="0"/>
           </a:p>
@@ -4562,7 +4620,7 @@
           <a:p>
             <a:fld id="{F4312ACB-2717-4B89-856B-5C23EA5FB67A}" type="datetime1">
               <a:rPr lang="en-US" smtClean="0"/>
-              <a:t>4/5/2019</a:t>
+              <a:t>4/10/2019</a:t>
             </a:fld>
             <a:endParaRPr lang="en-US" dirty="0"/>
           </a:p>
@@ -4874,7 +4932,7 @@
           <a:p>
             <a:fld id="{79F1936B-D5DD-47ED-92B1-3918596DDAF5}" type="datetime1">
               <a:rPr lang="en-US" smtClean="0"/>
-              <a:t>4/5/2019</a:t>
+              <a:t>4/10/2019</a:t>
             </a:fld>
             <a:endParaRPr lang="en-US" dirty="0"/>
           </a:p>
@@ -5454,7 +5512,7 @@
           <a:p>
             <a:fld id="{404B9E6B-4450-432D-90F9-E3D77F7A5492}" type="datetime1">
               <a:rPr lang="en-US" smtClean="0"/>
-              <a:t>4/5/2019</a:t>
+              <a:t>4/10/2019</a:t>
             </a:fld>
             <a:endParaRPr lang="en-US" dirty="0"/>
           </a:p>
@@ -6028,7 +6086,7 @@
           <a:p>
             <a:fld id="{5DB088E2-0DED-4CF3-BC36-58040D4E7094}" type="datetime1">
               <a:rPr lang="en-US" smtClean="0"/>
-              <a:t>4/5/2019</a:t>
+              <a:t>4/10/2019</a:t>
             </a:fld>
             <a:endParaRPr lang="en-US" dirty="0"/>
           </a:p>
@@ -6696,7 +6754,7 @@
           <a:p>
             <a:fld id="{EEEAFAA4-5071-480D-9C18-0B358B5FF408}" type="datetime1">
               <a:rPr lang="en-US" smtClean="0"/>
-              <a:t>4/5/2019</a:t>
+              <a:t>4/10/2019</a:t>
             </a:fld>
             <a:endParaRPr lang="en-US" dirty="0"/>
           </a:p>
@@ -7322,7 +7380,7 @@
           <a:p>
             <a:fld id="{0BEA4AE7-96F2-431D-8FB3-819607CE22AB}" type="datetime1">
               <a:rPr lang="en-US" smtClean="0"/>
-              <a:t>4/5/2019</a:t>
+              <a:t>4/10/2019</a:t>
             </a:fld>
             <a:endParaRPr lang="en-US" dirty="0"/>
           </a:p>
@@ -7787,7 +7845,7 @@
           <a:p>
             <a:fld id="{3950599E-C1F1-48B5-A612-E658E7209A04}" type="datetime1">
               <a:rPr lang="en-US" smtClean="0"/>
-              <a:t>4/5/2019</a:t>
+              <a:t>4/10/2019</a:t>
             </a:fld>
             <a:endParaRPr lang="en-US" dirty="0"/>
           </a:p>
@@ -8207,7 +8265,7 @@
           <a:p>
             <a:fld id="{7597E060-C7D1-4287-B3DC-1E54464674EB}" type="datetime1">
               <a:rPr lang="en-US" smtClean="0"/>
-              <a:t>4/5/2019</a:t>
+              <a:t>4/10/2019</a:t>
             </a:fld>
             <a:endParaRPr lang="en-US" dirty="0"/>
           </a:p>
@@ -8815,7 +8873,7 @@
           <a:p>
             <a:fld id="{5983F128-43F0-41E2-8FFA-D0EEC06F61CC}" type="datetime1">
               <a:rPr lang="en-US" smtClean="0"/>
-              <a:t>4/5/2019</a:t>
+              <a:t>4/10/2019</a:t>
             </a:fld>
             <a:endParaRPr lang="en-US" dirty="0"/>
           </a:p>
@@ -9392,7 +9450,7 @@
           <a:p>
             <a:fld id="{10F34636-13C0-4BCA-9243-152982BACFAD}" type="datetime1">
               <a:rPr lang="en-US" smtClean="0"/>
-              <a:t>4/5/2019</a:t>
+              <a:t>4/10/2019</a:t>
             </a:fld>
             <a:endParaRPr lang="en-US" dirty="0"/>
           </a:p>
@@ -9787,7 +9845,7 @@
           <a:p>
             <a:fld id="{EB9E288B-E0C3-4857-85B3-8868F0FA4A5C}" type="datetime1">
               <a:rPr lang="en-US" smtClean="0"/>
-              <a:t>4/5/2019</a:t>
+              <a:t>4/10/2019</a:t>
             </a:fld>
             <a:endParaRPr lang="en-US" dirty="0"/>
           </a:p>
@@ -10155,7 +10213,7 @@
           <a:p>
             <a:fld id="{053C559E-0576-4961-B4FA-A979B1920CE4}" type="datetime1">
               <a:rPr lang="en-US" smtClean="0"/>
-              <a:t>4/5/2019</a:t>
+              <a:t>4/10/2019</a:t>
             </a:fld>
             <a:endParaRPr lang="en-US" dirty="0"/>
           </a:p>
@@ -10509,7 +10567,7 @@
           <a:p>
             <a:fld id="{87CC915D-46DF-4665-9785-ECCF2E6ECA51}" type="datetime1">
               <a:rPr lang="en-US" smtClean="0"/>
-              <a:t>4/5/2019</a:t>
+              <a:t>4/10/2019</a:t>
             </a:fld>
             <a:endParaRPr lang="en-US" dirty="0"/>
           </a:p>
@@ -11128,7 +11186,7 @@
           <a:p>
             <a:fld id="{2EBBEE62-4EC6-44A8-AF1B-0B974D2B81B7}" type="datetime1">
               <a:rPr lang="en-US" smtClean="0"/>
-              <a:t>4/5/2019</a:t>
+              <a:t>4/10/2019</a:t>
             </a:fld>
             <a:endParaRPr lang="en-US" dirty="0"/>
           </a:p>
@@ -11513,7 +11571,7 @@
           <a:p>
             <a:fld id="{ED6A7A04-6CC3-4538-92CA-726C681632C3}" type="datetime1">
               <a:rPr lang="en-US" smtClean="0"/>
-              <a:t>4/5/2019</a:t>
+              <a:t>4/10/2019</a:t>
             </a:fld>
             <a:endParaRPr lang="en-US" dirty="0"/>
           </a:p>
@@ -12586,7 +12644,7 @@
           <a:p>
             <a:fld id="{42869D97-60F4-4119-BFCE-0F2A226F00D8}" type="datetime1">
               <a:rPr lang="en-US" smtClean="0"/>
-              <a:t>4/5/2019</a:t>
+              <a:t>4/10/2019</a:t>
             </a:fld>
             <a:endParaRPr lang="en-US" dirty="0"/>
           </a:p>
@@ -13415,7 +13473,7 @@
           <a:p>
             <a:fld id="{1B478CF4-D298-485C-AEC7-8BC37D7779B0}" type="datetime1">
               <a:rPr lang="en-US" smtClean="0"/>
-              <a:t>4/5/2019</a:t>
+              <a:t>4/10/2019</a:t>
             </a:fld>
             <a:endParaRPr lang="en-US" dirty="0"/>
           </a:p>
@@ -13628,7 +13686,7 @@
           <a:p>
             <a:fld id="{7165D0D6-47D4-45DB-8A1D-18D2CB108965}" type="datetime1">
               <a:rPr lang="en-US" smtClean="0"/>
-              <a:t>4/5/2019</a:t>
+              <a:t>4/10/2019</a:t>
             </a:fld>
             <a:endParaRPr lang="en-US" dirty="0"/>
           </a:p>
@@ -14385,7 +14443,7 @@
           <a:p>
             <a:fld id="{9324E9CA-4A9C-4AD5-A523-0F9AAF6B97DD}" type="datetime1">
               <a:rPr lang="en-US" smtClean="0"/>
-              <a:t>4/5/2019</a:t>
+              <a:t>4/10/2019</a:t>
             </a:fld>
             <a:endParaRPr lang="en-US" dirty="0"/>
           </a:p>
@@ -14618,7 +14676,7 @@
           <a:p>
             <a:fld id="{D925DE02-5038-47FC-8A90-3EF654B7AE9F}" type="datetime1">
               <a:rPr lang="en-US" smtClean="0"/>
-              <a:t>4/5/2019</a:t>
+              <a:t>4/10/2019</a:t>
             </a:fld>
             <a:endParaRPr lang="en-US" dirty="0"/>
           </a:p>
@@ -14866,7 +14924,7 @@
           <a:p>
             <a:fld id="{A76B25AF-55A0-4EE7-8078-946A4BCB016E}" type="datetime1">
               <a:rPr lang="en-US" smtClean="0"/>
-              <a:t>4/5/2019</a:t>
+              <a:t>4/10/2019</a:t>
             </a:fld>
             <a:endParaRPr lang="en-US" dirty="0"/>
           </a:p>
@@ -15308,7 +15366,7 @@
           <a:p>
             <a:fld id="{9495ADC2-0334-4EE3-B4F8-9D1B4B8E2F53}" type="datetime1">
               <a:rPr lang="en-US" smtClean="0"/>
-              <a:t>4/5/2019</a:t>
+              <a:t>4/10/2019</a:t>
             </a:fld>
             <a:endParaRPr lang="en-US" dirty="0"/>
           </a:p>
@@ -15567,7 +15625,7 @@
           <a:p>
             <a:fld id="{34A2D798-7E9C-4422-80A3-6CCB5D18A88D}" type="datetime1">
               <a:rPr lang="en-US" smtClean="0"/>
-              <a:t>4/5/2019</a:t>
+              <a:t>4/10/2019</a:t>
             </a:fld>
             <a:endParaRPr lang="en-US" dirty="0"/>
           </a:p>
@@ -15893,7 +15951,7 @@
           <a:p>
             <a:fld id="{0C98FD23-0DCB-4487-9369-0D5DE6B75693}" type="datetime1">
               <a:rPr lang="en-US" smtClean="0"/>
-              <a:t>4/5/2019</a:t>
+              <a:t>4/10/2019</a:t>
             </a:fld>
             <a:endParaRPr lang="en-US" dirty="0"/>
           </a:p>
@@ -16273,7 +16331,7 @@
           <a:p>
             <a:fld id="{CA73D935-DF36-4ADE-AD34-2CBC599BEBA5}" type="datetime1">
               <a:rPr lang="en-US" smtClean="0"/>
-              <a:t>4/5/2019</a:t>
+              <a:t>4/10/2019</a:t>
             </a:fld>
             <a:endParaRPr lang="en-US" dirty="0"/>
           </a:p>
@@ -16555,7 +16613,7 @@
           <a:p>
             <a:fld id="{0DB94ABA-99D5-4A2D-BA94-4A2053B82453}" type="datetime1">
               <a:rPr lang="en-US" smtClean="0"/>
-              <a:t>4/5/2019</a:t>
+              <a:t>4/10/2019</a:t>
             </a:fld>
             <a:endParaRPr lang="en-US" dirty="0"/>
           </a:p>
@@ -16892,7 +16950,7 @@
           <a:p>
             <a:fld id="{BE915BE9-5E52-442D-8E93-C03019733BB6}" type="datetime1">
               <a:rPr lang="en-US" smtClean="0"/>
-              <a:t>4/5/2019</a:t>
+              <a:t>4/10/2019</a:t>
             </a:fld>
             <a:endParaRPr lang="en-US" dirty="0"/>
           </a:p>
@@ -17244,7 +17302,7 @@
           <a:p>
             <a:fld id="{21D97E25-8B5F-4583-9051-F45248A8D8C6}" type="datetime1">
               <a:rPr lang="en-US" smtClean="0"/>
-              <a:t>4/5/2019</a:t>
+              <a:t>4/10/2019</a:t>
             </a:fld>
             <a:endParaRPr lang="en-US" dirty="0"/>
           </a:p>
@@ -17581,7 +17639,7 @@
           <a:p>
             <a:fld id="{5113CD45-DF80-4972-BBB1-7AD7C33A472D}" type="datetime1">
               <a:rPr lang="en-US" smtClean="0"/>
-              <a:t>4/5/2019</a:t>
+              <a:t>4/10/2019</a:t>
             </a:fld>
             <a:endParaRPr lang="en-US" dirty="0"/>
           </a:p>
@@ -17865,7 +17923,7 @@
           <a:p>
             <a:fld id="{5985B08C-554A-4F27-9E8C-9BED28B42B5D}" type="datetime1">
               <a:rPr lang="en-US" smtClean="0"/>
-              <a:t>4/5/2019</a:t>
+              <a:t>4/10/2019</a:t>
             </a:fld>
             <a:endParaRPr lang="en-US" dirty="0"/>
           </a:p>
@@ -18518,20 +18576,20 @@
           <a:p>
             <a:r>
               <a:rPr lang="en-US" dirty="0" smtClean="0"/>
-              <a:t>Thank You!</a:t>
-            </a:r>
-            <a:endParaRPr lang="en-US" dirty="0"/>
-          </a:p>
-        </p:txBody>
-      </p:sp>
-      <p:sp>
-        <p:nvSpPr>
-          <p:cNvPr id="3" name="Text Placeholder 2"/>
-          <p:cNvSpPr>
-            <a:spLocks noGrp="1"/>
-          </p:cNvSpPr>
-          <p:nvPr>
-            <p:ph type="body" sz="quarter" idx="13"/>
+              <a:t>Q&amp;A</a:t>
+            </a:r>
+            <a:endParaRPr lang="en-US" dirty="0"/>
+          </a:p>
+        </p:txBody>
+      </p:sp>
+      <p:sp>
+        <p:nvSpPr>
+          <p:cNvPr id="7" name="Content Placeholder 6"/>
+          <p:cNvSpPr>
+            <a:spLocks noGrp="1"/>
+          </p:cNvSpPr>
+          <p:nvPr>
+            <p:ph idx="1"/>
           </p:nvPr>
         </p:nvSpPr>
         <p:spPr/>
@@ -18540,6 +18598,220 @@
           <a:lstStyle/>
           <a:p>
             <a:r>
+              <a:rPr lang="en-US" dirty="0"/>
+              <a:t>Learn More: </a:t>
+            </a:r>
+            <a:r>
+              <a:rPr lang="en-US" dirty="0">
+                <a:hlinkClick r:id="rId2"/>
+              </a:rPr>
+              <a:t>http://</a:t>
+            </a:r>
+            <a:r>
+              <a:rPr lang="en-US" dirty="0" smtClean="0">
+                <a:hlinkClick r:id="rId2"/>
+              </a:rPr>
+              <a:t>mmdolbow.github.io/RESTendpts/index.html</a:t>
+            </a:r>
+            <a:endParaRPr lang="en-US" dirty="0" smtClean="0"/>
+          </a:p>
+          <a:p>
+            <a:r>
+              <a:rPr lang="en-US" dirty="0" smtClean="0"/>
+              <a:t>Find code on </a:t>
+            </a:r>
+            <a:r>
+              <a:rPr lang="en-US" dirty="0" err="1" smtClean="0"/>
+              <a:t>Github</a:t>
+            </a:r>
+            <a:r>
+              <a:rPr lang="en-US" dirty="0"/>
+              <a:t>: </a:t>
+            </a:r>
+            <a:r>
+              <a:rPr lang="en-US" dirty="0">
+                <a:hlinkClick r:id="rId3"/>
+              </a:rPr>
+              <a:t>https://</a:t>
+            </a:r>
+            <a:r>
+              <a:rPr lang="en-US" dirty="0" smtClean="0">
+                <a:hlinkClick r:id="rId3"/>
+              </a:rPr>
+              <a:t>github.com/mmdolbow/RESTendpts</a:t>
+            </a:r>
+            <a:r>
+              <a:rPr lang="en-US" dirty="0" smtClean="0"/>
+              <a:t> </a:t>
+            </a:r>
+          </a:p>
+          <a:p>
+            <a:r>
+              <a:rPr lang="en-US" dirty="0" smtClean="0"/>
+              <a:t>Find REST endpoints on </a:t>
+            </a:r>
+            <a:r>
+              <a:rPr lang="en-US" dirty="0"/>
+              <a:t>the Commons: </a:t>
+            </a:r>
+            <a:r>
+              <a:rPr lang="en-US" dirty="0">
+                <a:hlinkClick r:id="rId4"/>
+              </a:rPr>
+              <a:t>https://</a:t>
+            </a:r>
+            <a:r>
+              <a:rPr lang="en-US" dirty="0" smtClean="0">
+                <a:hlinkClick r:id="rId4"/>
+              </a:rPr>
+              <a:t>gisdata.mn.gov/dataset?res_format=ags_mapserver</a:t>
+            </a:r>
+            <a:r>
+              <a:rPr lang="en-US" dirty="0" smtClean="0"/>
+              <a:t> </a:t>
+            </a:r>
+            <a:endParaRPr lang="en-US" dirty="0"/>
+          </a:p>
+        </p:txBody>
+      </p:sp>
+      <p:sp>
+        <p:nvSpPr>
+          <p:cNvPr id="4" name="Date Placeholder 3"/>
+          <p:cNvSpPr>
+            <a:spLocks noGrp="1"/>
+          </p:cNvSpPr>
+          <p:nvPr>
+            <p:ph type="dt" sz="half" idx="10"/>
+          </p:nvPr>
+        </p:nvSpPr>
+        <p:spPr/>
+        <p:txBody>
+          <a:bodyPr/>
+          <a:lstStyle/>
+          <a:p>
+            <a:fld id="{7165D0D6-47D4-45DB-8A1D-18D2CB108965}" type="datetime1">
+              <a:rPr lang="en-US" smtClean="0"/>
+              <a:t>4/10/2019</a:t>
+            </a:fld>
+            <a:endParaRPr lang="en-US" dirty="0"/>
+          </a:p>
+        </p:txBody>
+      </p:sp>
+      <p:sp>
+        <p:nvSpPr>
+          <p:cNvPr id="5" name="Footer Placeholder 4"/>
+          <p:cNvSpPr>
+            <a:spLocks noGrp="1"/>
+          </p:cNvSpPr>
+          <p:nvPr>
+            <p:ph type="ftr" sz="quarter" idx="3"/>
+          </p:nvPr>
+        </p:nvSpPr>
+        <p:spPr/>
+        <p:txBody>
+          <a:bodyPr/>
+          <a:lstStyle/>
+          <a:p>
+            <a:r>
+              <a:rPr lang="en-US" smtClean="0"/>
+              <a:t>Learning about how REST is the BEST | gisdata.mn.gov</a:t>
+            </a:r>
+            <a:endParaRPr lang="en-US" dirty="0"/>
+          </a:p>
+        </p:txBody>
+      </p:sp>
+      <p:sp>
+        <p:nvSpPr>
+          <p:cNvPr id="6" name="Slide Number Placeholder 5"/>
+          <p:cNvSpPr>
+            <a:spLocks noGrp="1"/>
+          </p:cNvSpPr>
+          <p:nvPr>
+            <p:ph type="sldNum" sz="quarter" idx="12"/>
+          </p:nvPr>
+        </p:nvSpPr>
+        <p:spPr/>
+        <p:txBody>
+          <a:bodyPr/>
+          <a:lstStyle/>
+          <a:p>
+            <a:fld id="{48F63A3B-78C7-47BE-AE5E-E10140E04643}" type="slidenum">
+              <a:rPr lang="en-US" smtClean="0"/>
+              <a:t>10</a:t>
+            </a:fld>
+            <a:endParaRPr lang="en-US" dirty="0"/>
+          </a:p>
+        </p:txBody>
+      </p:sp>
+    </p:spTree>
+    <p:extLst>
+      <p:ext uri="{BB962C8B-B14F-4D97-AF65-F5344CB8AC3E}">
+        <p14:creationId xmlns:p14="http://schemas.microsoft.com/office/powerpoint/2010/main" val="2292317713"/>
+      </p:ext>
+    </p:extLst>
+  </p:cSld>
+  <p:clrMapOvr>
+    <a:masterClrMapping/>
+  </p:clrMapOvr>
+</p:sld>
+</file>
+
+<file path=ppt/slides/slide11.xml><?xml version="1.0" encoding="utf-8"?>
+<p:sld xmlns:a="http://schemas.openxmlformats.org/drawingml/2006/main" xmlns:r="http://schemas.openxmlformats.org/officeDocument/2006/relationships" xmlns:p="http://schemas.openxmlformats.org/presentationml/2006/main">
+  <p:cSld>
+    <p:spTree>
+      <p:nvGrpSpPr>
+        <p:cNvPr id="1" name=""/>
+        <p:cNvGrpSpPr/>
+        <p:nvPr/>
+      </p:nvGrpSpPr>
+      <p:grpSpPr>
+        <a:xfrm>
+          <a:off x="0" y="0"/>
+          <a:ext cx="0" cy="0"/>
+          <a:chOff x="0" y="0"/>
+          <a:chExt cx="0" cy="0"/>
+        </a:xfrm>
+      </p:grpSpPr>
+      <p:sp>
+        <p:nvSpPr>
+          <p:cNvPr id="2" name="Title 1"/>
+          <p:cNvSpPr>
+            <a:spLocks noGrp="1"/>
+          </p:cNvSpPr>
+          <p:nvPr>
+            <p:ph type="title"/>
+          </p:nvPr>
+        </p:nvSpPr>
+        <p:spPr/>
+        <p:txBody>
+          <a:bodyPr/>
+          <a:lstStyle/>
+          <a:p>
+            <a:r>
+              <a:rPr lang="en-US" dirty="0" smtClean="0"/>
+              <a:t>Thank You!</a:t>
+            </a:r>
+            <a:endParaRPr lang="en-US" dirty="0"/>
+          </a:p>
+        </p:txBody>
+      </p:sp>
+      <p:sp>
+        <p:nvSpPr>
+          <p:cNvPr id="3" name="Text Placeholder 2"/>
+          <p:cNvSpPr>
+            <a:spLocks noGrp="1"/>
+          </p:cNvSpPr>
+          <p:nvPr>
+            <p:ph type="body" sz="quarter" idx="13"/>
+          </p:nvPr>
+        </p:nvSpPr>
+        <p:spPr/>
+        <p:txBody>
+          <a:bodyPr/>
+          <a:lstStyle/>
+          <a:p>
+            <a:r>
               <a:rPr lang="en-US" sz="3200" b="1" dirty="0" smtClean="0"/>
               <a:t>Mike Dolbow</a:t>
             </a:r>
@@ -18578,7 +18850,7 @@
           <a:p>
             <a:fld id="{7A9FE6C5-9B0E-4FF8-B2F0-FA1C3CC1025A}" type="datetime1">
               <a:rPr lang="en-US" smtClean="0"/>
-              <a:t>4/5/2019</a:t>
+              <a:t>4/10/2019</a:t>
             </a:fld>
             <a:endParaRPr lang="en-US" dirty="0"/>
           </a:p>
@@ -18633,7 +18905,7 @@
             <a:fld id="{48F63A3B-78C7-47BE-AE5E-E10140E04643}" type="slidenum">
               <a:rPr lang="en-US" smtClean="0"/>
               <a:pPr/>
-              <a:t>10</a:t>
+              <a:t>11</a:t>
             </a:fld>
             <a:endParaRPr lang="en-US" dirty="0"/>
           </a:p>
@@ -19293,7 +19565,7 @@
           <a:p>
             <a:fld id="{BCBF2780-2777-43FD-9B47-5FD51B306A9F}" type="datetime1">
               <a:rPr lang="en-US" smtClean="0"/>
-              <a:t>4/5/2019</a:t>
+              <a:t>4/10/2019</a:t>
             </a:fld>
             <a:endParaRPr lang="en-US" dirty="0"/>
           </a:p>
@@ -19530,7 +19802,7 @@
           <a:p>
             <a:fld id="{7165D0D6-47D4-45DB-8A1D-18D2CB108965}" type="datetime1">
               <a:rPr lang="en-US" smtClean="0"/>
-              <a:t>4/5/2019</a:t>
+              <a:t>4/10/2019</a:t>
             </a:fld>
             <a:endParaRPr lang="en-US" dirty="0"/>
           </a:p>
@@ -19652,17 +19924,23 @@
           <a:p>
             <a:r>
               <a:rPr lang="en-US" dirty="0" smtClean="0"/>
-              <a:t>In the </a:t>
-            </a:r>
+              <a:t>In the Geospatial Commons</a:t>
+            </a:r>
+          </a:p>
+          <a:p>
             <a:r>
               <a:rPr lang="en-US" dirty="0" smtClean="0"/>
-              <a:t>Geospatial Commons</a:t>
-            </a:r>
-          </a:p>
-          <a:p>
+              <a:t>At </a:t>
+            </a:r>
             <a:r>
               <a:rPr lang="en-US" dirty="0" smtClean="0"/>
-              <a:t>At Data.gov</a:t>
+              <a:t>Data.gov</a:t>
+            </a:r>
+          </a:p>
+          <a:p>
+            <a:r>
+              <a:rPr lang="en-US" dirty="0" smtClean="0"/>
+              <a:t>From within AGOL</a:t>
             </a:r>
             <a:endParaRPr lang="en-US" dirty="0" smtClean="0"/>
           </a:p>
@@ -19699,15 +19977,7 @@
           <a:p>
             <a:r>
               <a:rPr lang="en-US" dirty="0" smtClean="0"/>
-              <a:t>By </a:t>
-            </a:r>
-            <a:r>
-              <a:rPr lang="en-US" dirty="0" smtClean="0"/>
-              <a:t>checking out the browser </a:t>
-            </a:r>
-            <a:r>
-              <a:rPr lang="en-US" dirty="0" smtClean="0"/>
-              <a:t>console (F12)</a:t>
+              <a:t>By checking out the browser console (F12)</a:t>
             </a:r>
             <a:endParaRPr lang="en-US" dirty="0"/>
           </a:p>
@@ -19766,7 +20036,7 @@
           <a:p>
             <a:fld id="{0DB94ABA-99D5-4A2D-BA94-4A2053B82453}" type="datetime1">
               <a:rPr lang="en-US" smtClean="0"/>
-              <a:t>4/5/2019</a:t>
+              <a:t>4/10/2019</a:t>
             </a:fld>
             <a:endParaRPr lang="en-US" dirty="0"/>
           </a:p>
@@ -19953,7 +20223,7 @@
           <a:p>
             <a:fld id="{BE915BE9-5E52-442D-8E93-C03019733BB6}" type="datetime1">
               <a:rPr lang="en-US" smtClean="0"/>
-              <a:t>4/5/2019</a:t>
+              <a:t>4/10/2019</a:t>
             </a:fld>
             <a:endParaRPr lang="en-US" dirty="0"/>
           </a:p>
@@ -20121,17 +20391,8 @@
           <a:p>
             <a:r>
               <a:rPr lang="en-US" dirty="0" smtClean="0"/>
-              <a:t>Use </a:t>
-            </a:r>
-            <a:r>
-              <a:rPr lang="en-US" dirty="0" smtClean="0"/>
-              <a:t>in </a:t>
-            </a:r>
-            <a:r>
-              <a:rPr lang="en-US" dirty="0" smtClean="0"/>
-              <a:t>ArcGIS Desktop</a:t>
-            </a:r>
-            <a:endParaRPr lang="en-US" dirty="0" smtClean="0"/>
+              <a:t>Use in ArcGIS Desktop</a:t>
+            </a:r>
           </a:p>
           <a:p>
             <a:r>
@@ -20142,11 +20403,7 @@
           <a:p>
             <a:r>
               <a:rPr lang="en-US" dirty="0" smtClean="0"/>
-              <a:t>Use in </a:t>
-            </a:r>
-            <a:r>
-              <a:rPr lang="en-US" dirty="0" smtClean="0"/>
-              <a:t>AGOL</a:t>
+              <a:t>Use in AGOL</a:t>
             </a:r>
           </a:p>
           <a:p>
@@ -20175,7 +20432,7 @@
           <a:p>
             <a:fld id="{0DB94ABA-99D5-4A2D-BA94-4A2053B82453}" type="datetime1">
               <a:rPr lang="en-US" smtClean="0"/>
-              <a:t>4/5/2019</a:t>
+              <a:t>4/10/2019</a:t>
             </a:fld>
             <a:endParaRPr lang="en-US" dirty="0"/>
           </a:p>
@@ -20314,7 +20571,7 @@
           <a:p>
             <a:r>
               <a:rPr lang="en-US" dirty="0" smtClean="0"/>
-              <a:t>Build Queries</a:t>
+              <a:t>Types of Services</a:t>
             </a:r>
             <a:endParaRPr lang="en-US" dirty="0"/>
           </a:p>
@@ -20336,26 +20593,29 @@
           <a:lstStyle/>
           <a:p>
             <a:r>
+              <a:rPr lang="en-US" dirty="0" err="1" smtClean="0"/>
+              <a:t>MapServer</a:t>
+            </a:r>
+            <a:endParaRPr lang="en-US" dirty="0" smtClean="0"/>
+          </a:p>
+          <a:p>
+            <a:r>
+              <a:rPr lang="en-US" dirty="0" err="1" smtClean="0"/>
+              <a:t>FeatureServer</a:t>
+            </a:r>
+            <a:endParaRPr lang="en-US" dirty="0" smtClean="0"/>
+          </a:p>
+          <a:p>
+            <a:r>
+              <a:rPr lang="en-US" dirty="0" err="1" smtClean="0"/>
+              <a:t>GPServer</a:t>
+            </a:r>
+            <a:endParaRPr lang="en-US" dirty="0" smtClean="0"/>
+          </a:p>
+          <a:p>
+            <a:r>
               <a:rPr lang="en-US" dirty="0" smtClean="0"/>
-              <a:t>Pick a layer</a:t>
-            </a:r>
-          </a:p>
-          <a:p>
-            <a:r>
-              <a:rPr lang="en-US" dirty="0" smtClean="0"/>
-              <a:t>Find “Query” operation at the bottom</a:t>
-            </a:r>
-          </a:p>
-          <a:p>
-            <a:r>
-              <a:rPr lang="en-US" dirty="0" smtClean="0"/>
-              <a:t>Start trying stuff!</a:t>
-            </a:r>
-          </a:p>
-          <a:p>
-            <a:r>
-              <a:rPr lang="en-US" dirty="0" smtClean="0"/>
-              <a:t>Demo (again)</a:t>
+              <a:t>Utilities</a:t>
             </a:r>
             <a:endParaRPr lang="en-US" dirty="0"/>
           </a:p>
@@ -20378,7 +20638,7 @@
           <a:p>
             <a:fld id="{0DB94ABA-99D5-4A2D-BA94-4A2053B82453}" type="datetime1">
               <a:rPr lang="en-US" smtClean="0"/>
-              <a:t>4/5/2019</a:t>
+              <a:t>4/10/2019</a:t>
             </a:fld>
             <a:endParaRPr lang="en-US" dirty="0"/>
           </a:p>
@@ -20430,44 +20690,10 @@
           </a:p>
         </p:txBody>
       </p:sp>
-      <p:pic>
-        <p:nvPicPr>
-          <p:cNvPr id="8" name="Picture 7"/>
-          <p:cNvPicPr>
-            <a:picLocks noChangeAspect="1"/>
-          </p:cNvPicPr>
-          <p:nvPr/>
-        </p:nvPicPr>
-        <p:blipFill>
-          <a:blip r:embed="rId2"/>
-          <a:stretch>
-            <a:fillRect/>
-          </a:stretch>
-        </p:blipFill>
-        <p:spPr>
-          <a:xfrm>
-            <a:off x="5162550" y="3371850"/>
-            <a:ext cx="5219700" cy="1466850"/>
-          </a:xfrm>
-          <a:prstGeom prst="rect">
-            <a:avLst/>
-          </a:prstGeom>
-          <a:ln>
-            <a:noFill/>
-          </a:ln>
-          <a:effectLst>
-            <a:outerShdw blurRad="292100" dist="139700" dir="2700000" algn="tl" rotWithShape="0">
-              <a:srgbClr val="333333">
-                <a:alpha val="65000"/>
-              </a:srgbClr>
-            </a:outerShdw>
-          </a:effectLst>
-        </p:spPr>
-      </p:pic>
     </p:spTree>
     <p:extLst>
       <p:ext uri="{BB962C8B-B14F-4D97-AF65-F5344CB8AC3E}">
-        <p14:creationId xmlns:p14="http://schemas.microsoft.com/office/powerpoint/2010/main" val="2843295786"/>
+        <p14:creationId xmlns:p14="http://schemas.microsoft.com/office/powerpoint/2010/main" val="2349588902"/>
       </p:ext>
     </p:extLst>
   </p:cSld>
@@ -20511,7 +20737,7 @@
           <a:p>
             <a:r>
               <a:rPr lang="en-US" dirty="0" smtClean="0"/>
-              <a:t>Web Development</a:t>
+              <a:t>Build Queries</a:t>
             </a:r>
             <a:endParaRPr lang="en-US" dirty="0"/>
           </a:p>
@@ -20527,25 +20753,32 @@
             <p:ph idx="1"/>
           </p:nvPr>
         </p:nvSpPr>
-        <p:spPr>
-          <a:xfrm>
-            <a:off x="838200" y="1825625"/>
-            <a:ext cx="1737685" cy="4351338"/>
-          </a:xfrm>
-        </p:spPr>
+        <p:spPr/>
         <p:txBody>
           <a:bodyPr/>
           <a:lstStyle/>
           <a:p>
             <a:r>
               <a:rPr lang="en-US" dirty="0" smtClean="0"/>
-              <a:t>Point in Poly</a:t>
-            </a:r>
-          </a:p>
-          <a:p>
-            <a:r>
-              <a:rPr lang="en-US" dirty="0" err="1" smtClean="0"/>
-              <a:t>GeoJSON</a:t>
+              <a:t>Pick a layer</a:t>
+            </a:r>
+          </a:p>
+          <a:p>
+            <a:r>
+              <a:rPr lang="en-US" dirty="0" smtClean="0"/>
+              <a:t>Find “Query” operation at the bottom</a:t>
+            </a:r>
+          </a:p>
+          <a:p>
+            <a:r>
+              <a:rPr lang="en-US" dirty="0" smtClean="0"/>
+              <a:t>Start trying stuff!</a:t>
+            </a:r>
+          </a:p>
+          <a:p>
+            <a:r>
+              <a:rPr lang="en-US" dirty="0" smtClean="0"/>
+              <a:t>Demo (again)</a:t>
             </a:r>
             <a:endParaRPr lang="en-US" dirty="0"/>
           </a:p>
@@ -20568,7 +20801,7 @@
           <a:p>
             <a:fld id="{0DB94ABA-99D5-4A2D-BA94-4A2053B82453}" type="datetime1">
               <a:rPr lang="en-US" smtClean="0"/>
-              <a:t>4/5/2019</a:t>
+              <a:t>4/10/2019</a:t>
             </a:fld>
             <a:endParaRPr lang="en-US" dirty="0"/>
           </a:p>
@@ -20622,30 +20855,22 @@
       </p:sp>
       <p:pic>
         <p:nvPicPr>
-          <p:cNvPr id="7" name="Picture 6" descr="Screen Clipping">
-            <a:hlinkClick r:id="rId2"/>
-          </p:cNvPr>
+          <p:cNvPr id="8" name="Picture 7"/>
           <p:cNvPicPr>
             <a:picLocks noChangeAspect="1"/>
           </p:cNvPicPr>
           <p:nvPr/>
         </p:nvPicPr>
         <p:blipFill>
-          <a:blip r:embed="rId3">
-            <a:extLst>
-              <a:ext uri="{28A0092B-C50C-407E-A947-70E740481C1C}">
-                <a14:useLocalDpi xmlns:a14="http://schemas.microsoft.com/office/drawing/2010/main" val="0"/>
-              </a:ext>
-            </a:extLst>
-          </a:blip>
+          <a:blip r:embed="rId2"/>
           <a:stretch>
             <a:fillRect/>
           </a:stretch>
         </p:blipFill>
         <p:spPr>
           <a:xfrm>
-            <a:off x="2613985" y="1524448"/>
-            <a:ext cx="8983329" cy="4953691"/>
+            <a:off x="5162550" y="3371850"/>
+            <a:ext cx="5219700" cy="1466850"/>
           </a:xfrm>
           <a:prstGeom prst="rect">
             <a:avLst/>
@@ -20665,7 +20890,7 @@
     </p:spTree>
     <p:extLst>
       <p:ext uri="{BB962C8B-B14F-4D97-AF65-F5344CB8AC3E}">
-        <p14:creationId xmlns:p14="http://schemas.microsoft.com/office/powerpoint/2010/main" val="383432827"/>
+        <p14:creationId xmlns:p14="http://schemas.microsoft.com/office/powerpoint/2010/main" val="2843295786"/>
       </p:ext>
     </p:extLst>
   </p:cSld>
@@ -20709,15 +20934,15 @@
           <a:p>
             <a:r>
               <a:rPr lang="en-US" dirty="0" smtClean="0"/>
-              <a:t>Q&amp;A</a:t>
-            </a:r>
-            <a:endParaRPr lang="en-US" dirty="0"/>
-          </a:p>
-        </p:txBody>
-      </p:sp>
-      <p:sp>
-        <p:nvSpPr>
-          <p:cNvPr id="7" name="Content Placeholder 6"/>
+              <a:t>Web Development</a:t>
+            </a:r>
+            <a:endParaRPr lang="en-US" dirty="0"/>
+          </a:p>
+        </p:txBody>
+      </p:sp>
+      <p:sp>
+        <p:nvSpPr>
+          <p:cNvPr id="3" name="Content Placeholder 2"/>
           <p:cNvSpPr>
             <a:spLocks noGrp="1"/>
           </p:cNvSpPr>
@@ -20725,83 +20950,25 @@
             <p:ph idx="1"/>
           </p:nvPr>
         </p:nvSpPr>
-        <p:spPr/>
+        <p:spPr>
+          <a:xfrm>
+            <a:off x="838200" y="1825625"/>
+            <a:ext cx="1737685" cy="4351338"/>
+          </a:xfrm>
+        </p:spPr>
         <p:txBody>
           <a:bodyPr/>
           <a:lstStyle/>
           <a:p>
             <a:r>
-              <a:rPr lang="en-US" dirty="0"/>
-              <a:t>Learn More: </a:t>
-            </a:r>
-            <a:r>
-              <a:rPr lang="en-US" dirty="0">
-                <a:hlinkClick r:id="rId2"/>
-              </a:rPr>
-              <a:t>http://</a:t>
-            </a:r>
-            <a:r>
-              <a:rPr lang="en-US" dirty="0" smtClean="0">
-                <a:hlinkClick r:id="rId2"/>
-              </a:rPr>
-              <a:t>mmdolbow.github.io/RESTendpts/index.html</a:t>
-            </a:r>
-            <a:endParaRPr lang="en-US" dirty="0" smtClean="0"/>
-          </a:p>
-          <a:p>
-            <a:r>
               <a:rPr lang="en-US" dirty="0" smtClean="0"/>
-              <a:t>Find code on </a:t>
-            </a:r>
+              <a:t>Point in Poly</a:t>
+            </a:r>
+          </a:p>
+          <a:p>
             <a:r>
               <a:rPr lang="en-US" dirty="0" err="1" smtClean="0"/>
-              <a:t>Github</a:t>
-            </a:r>
-            <a:r>
-              <a:rPr lang="en-US" dirty="0"/>
-              <a:t>: </a:t>
-            </a:r>
-            <a:r>
-              <a:rPr lang="en-US" dirty="0">
-                <a:hlinkClick r:id="rId3"/>
-              </a:rPr>
-              <a:t>https://</a:t>
-            </a:r>
-            <a:r>
-              <a:rPr lang="en-US" dirty="0" smtClean="0">
-                <a:hlinkClick r:id="rId3"/>
-              </a:rPr>
-              <a:t>github.com/mmdolbow/RESTendpts</a:t>
-            </a:r>
-            <a:r>
-              <a:rPr lang="en-US" dirty="0" smtClean="0"/>
-              <a:t> </a:t>
-            </a:r>
-          </a:p>
-          <a:p>
-            <a:r>
-              <a:rPr lang="en-US" dirty="0" smtClean="0"/>
-              <a:t>Find REST endpoints on </a:t>
-            </a:r>
-            <a:r>
-              <a:rPr lang="en-US" dirty="0"/>
-              <a:t>the Commons: </a:t>
-            </a:r>
-            <a:r>
-              <a:rPr lang="en-US" dirty="0">
-                <a:hlinkClick r:id="rId4"/>
-              </a:rPr>
-              <a:t>https://</a:t>
-            </a:r>
-            <a:r>
-              <a:rPr lang="en-US" dirty="0" smtClean="0">
-                <a:hlinkClick r:id="rId4"/>
-              </a:rPr>
-              <a:t>gisdata.mn.gov/dataset?res_format=ags_mapserver</a:t>
-            </a:r>
-            <a:r>
-              <a:rPr lang="en-US" dirty="0" smtClean="0"/>
-              <a:t> </a:t>
+              <a:t>GeoJSON</a:t>
             </a:r>
             <a:endParaRPr lang="en-US" dirty="0"/>
           </a:p>
@@ -20822,9 +20989,9 @@
           <a:bodyPr/>
           <a:lstStyle/>
           <a:p>
-            <a:fld id="{7165D0D6-47D4-45DB-8A1D-18D2CB108965}" type="datetime1">
-              <a:rPr lang="en-US" smtClean="0"/>
-              <a:t>4/5/2019</a:t>
+            <a:fld id="{0DB94ABA-99D5-4A2D-BA94-4A2053B82453}" type="datetime1">
+              <a:rPr lang="en-US" smtClean="0"/>
+              <a:t>4/10/2019</a:t>
             </a:fld>
             <a:endParaRPr lang="en-US" dirty="0"/>
           </a:p>
@@ -20876,10 +21043,52 @@
           </a:p>
         </p:txBody>
       </p:sp>
+      <p:pic>
+        <p:nvPicPr>
+          <p:cNvPr id="7" name="Picture 6" descr="Screen Clipping">
+            <a:hlinkClick r:id="rId2"/>
+          </p:cNvPr>
+          <p:cNvPicPr>
+            <a:picLocks noChangeAspect="1"/>
+          </p:cNvPicPr>
+          <p:nvPr/>
+        </p:nvPicPr>
+        <p:blipFill>
+          <a:blip r:embed="rId3">
+            <a:extLst>
+              <a:ext uri="{28A0092B-C50C-407E-A947-70E740481C1C}">
+                <a14:useLocalDpi xmlns:a14="http://schemas.microsoft.com/office/drawing/2010/main" val="0"/>
+              </a:ext>
+            </a:extLst>
+          </a:blip>
+          <a:stretch>
+            <a:fillRect/>
+          </a:stretch>
+        </p:blipFill>
+        <p:spPr>
+          <a:xfrm>
+            <a:off x="2613985" y="1524448"/>
+            <a:ext cx="8983329" cy="4953691"/>
+          </a:xfrm>
+          <a:prstGeom prst="rect">
+            <a:avLst/>
+          </a:prstGeom>
+          <a:ln>
+            <a:noFill/>
+          </a:ln>
+          <a:effectLst>
+            <a:outerShdw blurRad="292100" dist="139700" dir="2700000" algn="tl" rotWithShape="0">
+              <a:srgbClr val="333333">
+                <a:alpha val="65000"/>
+              </a:srgbClr>
+            </a:outerShdw>
+          </a:effectLst>
+        </p:spPr>
+      </p:pic>
     </p:spTree>
     <p:extLst>
       <p:ext uri="{BB962C8B-B14F-4D97-AF65-F5344CB8AC3E}">
-        <p14:creationId xmlns:p14="http://schemas.microsoft.com/office/powerpoint/2010/main" val="2292317713"/>
+        <p14:creationId xmlns:p14="http://schemas.microsoft.com/office/powerpoint/2010/main" val="383432827"/>
       </p:ext>
     </p:extLst>
   </p:cSld>
@@ -21582,12 +21791,9 @@
 </file>
 
 <file path=customXml/item1.xml><?xml version="1.0" encoding="utf-8"?>
-<?mso-contentType ?>
-<FormTemplates xmlns="http://schemas.microsoft.com/sharepoint/v3/contenttype/forms">
-  <Display>DocumentLibraryForm</Display>
-  <Edit>DocumentLibraryForm</Edit>
-  <New>DocumentLibraryForm</New>
-</FormTemplates>
+<p:properties xmlns:p="http://schemas.microsoft.com/office/2006/metadata/properties" xmlns:xsi="http://www.w3.org/2001/XMLSchema-instance" xmlns:pc="http://schemas.microsoft.com/office/infopath/2007/PartnerControls">
+  <documentManagement/>
+</p:properties>
 </file>
 
 <file path=customXml/item2.xml><?xml version="1.0" encoding="utf-8"?>
@@ -21705,15 +21911,25 @@
 </file>
 
 <file path=customXml/item3.xml><?xml version="1.0" encoding="utf-8"?>
-<p:properties xmlns:p="http://schemas.microsoft.com/office/2006/metadata/properties" xmlns:xsi="http://www.w3.org/2001/XMLSchema-instance" xmlns:pc="http://schemas.microsoft.com/office/infopath/2007/PartnerControls">
-  <documentManagement/>
-</p:properties>
+<?mso-contentType ?>
+<FormTemplates xmlns="http://schemas.microsoft.com/sharepoint/v3/contenttype/forms">
+  <Display>DocumentLibraryForm</Display>
+  <Edit>DocumentLibraryForm</Edit>
+  <New>DocumentLibraryForm</New>
+</FormTemplates>
 </file>
 
 <file path=customXml/itemProps1.xml><?xml version="1.0" encoding="utf-8"?>
-<ds:datastoreItem xmlns:ds="http://schemas.openxmlformats.org/officeDocument/2006/customXml" ds:itemID="{67F4349A-22F7-4A2D-8CA5-43DDCD679590}">
+<ds:datastoreItem xmlns:ds="http://schemas.openxmlformats.org/officeDocument/2006/customXml" ds:itemID="{9678B604-9059-4F1C-B8E2-C96A71A964D2}">
   <ds:schemaRefs>
-    <ds:schemaRef ds:uri="http://schemas.microsoft.com/sharepoint/v3/contenttype/forms"/>
+    <ds:schemaRef ds:uri="http://purl.org/dc/elements/1.1/"/>
+    <ds:schemaRef ds:uri="http://schemas.microsoft.com/office/2006/metadata/properties"/>
+    <ds:schemaRef ds:uri="http://schemas.openxmlformats.org/package/2006/metadata/core-properties"/>
+    <ds:schemaRef ds:uri="http://schemas.microsoft.com/office/2006/documentManagement/types"/>
+    <ds:schemaRef ds:uri="http://purl.org/dc/terms/"/>
+    <ds:schemaRef ds:uri="http://schemas.microsoft.com/office/infopath/2007/PartnerControls"/>
+    <ds:schemaRef ds:uri="http://www.w3.org/XML/1998/namespace"/>
+    <ds:schemaRef ds:uri="http://purl.org/dc/dcmitype/"/>
   </ds:schemaRefs>
 </ds:datastoreItem>
 </file>
@@ -21735,16 +21951,9 @@
 </file>
 
 <file path=customXml/itemProps3.xml><?xml version="1.0" encoding="utf-8"?>
-<ds:datastoreItem xmlns:ds="http://schemas.openxmlformats.org/officeDocument/2006/customXml" ds:itemID="{9678B604-9059-4F1C-B8E2-C96A71A964D2}">
+<ds:datastoreItem xmlns:ds="http://schemas.openxmlformats.org/officeDocument/2006/customXml" ds:itemID="{67F4349A-22F7-4A2D-8CA5-43DDCD679590}">
   <ds:schemaRefs>
-    <ds:schemaRef ds:uri="http://purl.org/dc/elements/1.1/"/>
-    <ds:schemaRef ds:uri="http://schemas.microsoft.com/office/2006/metadata/properties"/>
-    <ds:schemaRef ds:uri="http://schemas.openxmlformats.org/package/2006/metadata/core-properties"/>
-    <ds:schemaRef ds:uri="http://schemas.microsoft.com/office/2006/documentManagement/types"/>
-    <ds:schemaRef ds:uri="http://purl.org/dc/terms/"/>
-    <ds:schemaRef ds:uri="http://schemas.microsoft.com/office/infopath/2007/PartnerControls"/>
-    <ds:schemaRef ds:uri="http://www.w3.org/XML/1998/namespace"/>
-    <ds:schemaRef ds:uri="http://purl.org/dc/dcmitype/"/>
+    <ds:schemaRef ds:uri="http://schemas.microsoft.com/sharepoint/v3/contenttype/forms"/>
   </ds:schemaRefs>
 </ds:datastoreItem>
 </file>
</xml_diff>